<commit_message>
Problem on csv col
</commit_message>
<xml_diff>
--- a/Docs/Draft/Draft_Struct.pptx
+++ b/Docs/Draft/Draft_Struct.pptx
@@ -302,7 +302,7 @@
           <a:p>
             <a:fld id="{1E852E34-5808-411D-82B1-F5678CCA79B1}" type="datetimeFigureOut">
               <a:rPr lang="fr-FR" smtClean="0"/>
-              <a:t>25/08/2019</a:t>
+              <a:t>26/08/2019</a:t>
             </a:fld>
             <a:endParaRPr lang="fr-FR"/>
           </a:p>
@@ -500,7 +500,7 @@
           <a:p>
             <a:fld id="{1E852E34-5808-411D-82B1-F5678CCA79B1}" type="datetimeFigureOut">
               <a:rPr lang="fr-FR" smtClean="0"/>
-              <a:t>25/08/2019</a:t>
+              <a:t>26/08/2019</a:t>
             </a:fld>
             <a:endParaRPr lang="fr-FR"/>
           </a:p>
@@ -708,7 +708,7 @@
           <a:p>
             <a:fld id="{1E852E34-5808-411D-82B1-F5678CCA79B1}" type="datetimeFigureOut">
               <a:rPr lang="fr-FR" smtClean="0"/>
-              <a:t>25/08/2019</a:t>
+              <a:t>26/08/2019</a:t>
             </a:fld>
             <a:endParaRPr lang="fr-FR"/>
           </a:p>
@@ -906,7 +906,7 @@
           <a:p>
             <a:fld id="{1E852E34-5808-411D-82B1-F5678CCA79B1}" type="datetimeFigureOut">
               <a:rPr lang="fr-FR" smtClean="0"/>
-              <a:t>25/08/2019</a:t>
+              <a:t>26/08/2019</a:t>
             </a:fld>
             <a:endParaRPr lang="fr-FR"/>
           </a:p>
@@ -1181,7 +1181,7 @@
           <a:p>
             <a:fld id="{1E852E34-5808-411D-82B1-F5678CCA79B1}" type="datetimeFigureOut">
               <a:rPr lang="fr-FR" smtClean="0"/>
-              <a:t>25/08/2019</a:t>
+              <a:t>26/08/2019</a:t>
             </a:fld>
             <a:endParaRPr lang="fr-FR"/>
           </a:p>
@@ -1446,7 +1446,7 @@
           <a:p>
             <a:fld id="{1E852E34-5808-411D-82B1-F5678CCA79B1}" type="datetimeFigureOut">
               <a:rPr lang="fr-FR" smtClean="0"/>
-              <a:t>25/08/2019</a:t>
+              <a:t>26/08/2019</a:t>
             </a:fld>
             <a:endParaRPr lang="fr-FR"/>
           </a:p>
@@ -1858,7 +1858,7 @@
           <a:p>
             <a:fld id="{1E852E34-5808-411D-82B1-F5678CCA79B1}" type="datetimeFigureOut">
               <a:rPr lang="fr-FR" smtClean="0"/>
-              <a:t>25/08/2019</a:t>
+              <a:t>26/08/2019</a:t>
             </a:fld>
             <a:endParaRPr lang="fr-FR"/>
           </a:p>
@@ -1999,7 +1999,7 @@
           <a:p>
             <a:fld id="{1E852E34-5808-411D-82B1-F5678CCA79B1}" type="datetimeFigureOut">
               <a:rPr lang="fr-FR" smtClean="0"/>
-              <a:t>25/08/2019</a:t>
+              <a:t>26/08/2019</a:t>
             </a:fld>
             <a:endParaRPr lang="fr-FR"/>
           </a:p>
@@ -2112,7 +2112,7 @@
           <a:p>
             <a:fld id="{1E852E34-5808-411D-82B1-F5678CCA79B1}" type="datetimeFigureOut">
               <a:rPr lang="fr-FR" smtClean="0"/>
-              <a:t>25/08/2019</a:t>
+              <a:t>26/08/2019</a:t>
             </a:fld>
             <a:endParaRPr lang="fr-FR"/>
           </a:p>
@@ -2423,7 +2423,7 @@
           <a:p>
             <a:fld id="{1E852E34-5808-411D-82B1-F5678CCA79B1}" type="datetimeFigureOut">
               <a:rPr lang="fr-FR" smtClean="0"/>
-              <a:t>25/08/2019</a:t>
+              <a:t>26/08/2019</a:t>
             </a:fld>
             <a:endParaRPr lang="fr-FR"/>
           </a:p>
@@ -2711,7 +2711,7 @@
           <a:p>
             <a:fld id="{1E852E34-5808-411D-82B1-F5678CCA79B1}" type="datetimeFigureOut">
               <a:rPr lang="fr-FR" smtClean="0"/>
-              <a:t>25/08/2019</a:t>
+              <a:t>26/08/2019</a:t>
             </a:fld>
             <a:endParaRPr lang="fr-FR"/>
           </a:p>
@@ -2952,7 +2952,7 @@
           <a:p>
             <a:fld id="{1E852E34-5808-411D-82B1-F5678CCA79B1}" type="datetimeFigureOut">
               <a:rPr lang="fr-FR" smtClean="0"/>
-              <a:t>25/08/2019</a:t>
+              <a:t>26/08/2019</a:t>
             </a:fld>
             <a:endParaRPr lang="fr-FR"/>
           </a:p>
@@ -21549,7 +21549,7 @@
         <p:spPr>
           <a:xfrm>
             <a:off x="243281" y="1342239"/>
-            <a:ext cx="5998502" cy="2308324"/>
+            <a:ext cx="5998502" cy="2585323"/>
           </a:xfrm>
           <a:prstGeom prst="rect">
             <a:avLst/>
@@ -21857,218 +21857,254 @@
           </a:p>
           <a:p>
             <a:r>
+              <a:rPr lang="fr-FR">
+                <a:hlinkClick r:id="rId6"/>
+              </a:rPr>
+              <a:t>V</a:t>
+            </a:r>
+            <a:r>
               <a:rPr lang="en-001">
                 <a:hlinkClick r:id="rId6"/>
               </a:rPr>
-              <a:t>Descente de gradi</a:t>
+              <a:t>i</a:t>
             </a:r>
             <a:r>
               <a:rPr lang="fr-FR">
                 <a:hlinkClick r:id="rId6"/>
               </a:rPr>
-              <a:t>e</a:t>
+              <a:t>d</a:t>
             </a:r>
             <a:r>
               <a:rPr lang="en-001">
                 <a:hlinkClick r:id="rId6"/>
               </a:rPr>
-              <a:t>n</a:t>
+              <a:t>e</a:t>
             </a:r>
             <a:r>
               <a:rPr lang="fr-FR">
                 <a:hlinkClick r:id="rId6"/>
               </a:rPr>
-              <a:t>t</a:t>
-            </a:r>
-            <a:r>
-              <a:rPr lang="en-001">
-                <a:hlinkClick r:id="rId6"/>
-              </a:rPr>
+              <a:t>o</a:t>
+            </a:r>
+            <a:r>
+              <a:rPr lang="en-001"/>
               <a:t> </a:t>
             </a:r>
             <a:r>
-              <a:rPr lang="fr-FR">
-                <a:hlinkClick r:id="rId6"/>
-              </a:rPr>
-              <a:t>s</a:t>
-            </a:r>
-            <a:r>
-              <a:rPr lang="en-001">
-                <a:hlinkClick r:id="rId6"/>
-              </a:rPr>
-              <a:t>t</a:t>
-            </a:r>
-            <a:r>
-              <a:rPr lang="fr-FR">
-                <a:hlinkClick r:id="rId6"/>
-              </a:rPr>
-              <a:t>o</a:t>
-            </a:r>
-            <a:r>
-              <a:rPr lang="en-001">
-                <a:hlinkClick r:id="rId6"/>
-              </a:rPr>
-              <a:t>c</a:t>
-            </a:r>
-            <a:r>
-              <a:rPr lang="fr-FR">
-                <a:hlinkClick r:id="rId6"/>
-              </a:rPr>
-              <a:t>h</a:t>
-            </a:r>
-            <a:r>
-              <a:rPr lang="en-001">
-                <a:hlinkClick r:id="rId6"/>
-              </a:rPr>
-              <a:t>a</a:t>
-            </a:r>
-            <a:r>
-              <a:rPr lang="fr-FR">
-                <a:hlinkClick r:id="rId6"/>
-              </a:rPr>
-              <a:t>s</a:t>
-            </a:r>
-            <a:r>
-              <a:rPr lang="en-001">
-                <a:hlinkClick r:id="rId6"/>
-              </a:rPr>
-              <a:t>t</a:t>
-            </a:r>
-            <a:r>
-              <a:rPr lang="fr-FR">
-                <a:hlinkClick r:id="rId6"/>
-              </a:rPr>
-              <a:t>i</a:t>
-            </a:r>
-            <a:r>
-              <a:rPr lang="en-001">
-                <a:hlinkClick r:id="rId6"/>
-              </a:rPr>
-              <a:t>q</a:t>
-            </a:r>
-            <a:r>
-              <a:rPr lang="fr-FR">
-                <a:hlinkClick r:id="rId6"/>
-              </a:rPr>
-              <a:t>u</a:t>
-            </a:r>
-            <a:r>
-              <a:rPr lang="en-001">
-                <a:hlinkClick r:id="rId6"/>
-              </a:rPr>
-              <a:t>e Adam</a:t>
-            </a:r>
-            <a:r>
-              <a:rPr lang="en-001"/>
-              <a:t> + </a:t>
+              <a:rPr lang="fr-FR"/>
+              <a:t>e</a:t>
+            </a:r>
+            <a:r>
+              <a:rPr lang="en-001"/>
+              <a:t>t </a:t>
             </a:r>
             <a:r>
               <a:rPr lang="en-001">
                 <a:hlinkClick r:id="rId7"/>
               </a:rPr>
-              <a:t>do</a:t>
-            </a:r>
-            <a:r>
-              <a:rPr lang="fr-FR">
-                <a:hlinkClick r:id="rId7"/>
-              </a:rPr>
-              <a:t>c</a:t>
-            </a:r>
-            <a:r>
-              <a:rPr lang="en-001">
-                <a:hlinkClick r:id="rId7"/>
-              </a:rPr>
-              <a:t>u</a:t>
-            </a:r>
-            <a:r>
-              <a:rPr lang="fr-FR">
-                <a:hlinkClick r:id="rId7"/>
-              </a:rPr>
-              <a:t>m</a:t>
-            </a:r>
-            <a:r>
-              <a:rPr lang="en-001">
-                <a:hlinkClick r:id="rId7"/>
-              </a:rPr>
-              <a:t>e</a:t>
-            </a:r>
-            <a:r>
-              <a:rPr lang="fr-FR">
-                <a:hlinkClick r:id="rId7"/>
-              </a:rPr>
-              <a:t>n</a:t>
-            </a:r>
-            <a:r>
-              <a:rPr lang="en-001">
-                <a:hlinkClick r:id="rId7"/>
-              </a:rPr>
-              <a:t>t </a:t>
-            </a:r>
-            <a:r>
-              <a:rPr lang="fr-FR">
-                <a:hlinkClick r:id="rId7"/>
-              </a:rPr>
-              <a:t>o</a:t>
-            </a:r>
-            <a:r>
-              <a:rPr lang="en-001">
-                <a:hlinkClick r:id="rId7"/>
-              </a:rPr>
-              <a:t>f</a:t>
-            </a:r>
-            <a:r>
-              <a:rPr lang="fr-FR">
-                <a:hlinkClick r:id="rId7"/>
-              </a:rPr>
-              <a:t>f</a:t>
-            </a:r>
-            <a:r>
-              <a:rPr lang="en-001">
-                <a:hlinkClick r:id="rId7"/>
-              </a:rPr>
-              <a:t>i</a:t>
-            </a:r>
-            <a:r>
-              <a:rPr lang="fr-FR">
-                <a:hlinkClick r:id="rId7"/>
-              </a:rPr>
-              <a:t>c</a:t>
-            </a:r>
-            <a:r>
-              <a:rPr lang="en-001">
-                <a:hlinkClick r:id="rId7"/>
-              </a:rPr>
-              <a:t>i</a:t>
-            </a:r>
-            <a:r>
-              <a:rPr lang="fr-FR">
-                <a:hlinkClick r:id="rId7"/>
-              </a:rPr>
-              <a:t>a</a:t>
-            </a:r>
-            <a:r>
-              <a:rPr lang="en-001">
-                <a:hlinkClick r:id="rId7"/>
-              </a:rPr>
-              <a:t>l</a:t>
-            </a:r>
-            <a:endParaRPr lang="en-001"/>
+              <a:t>Cours</a:t>
+            </a:r>
+            <a:r>
+              <a:rPr lang="en-001"/>
+              <a:t> pas mal sur le RNN LSTM</a:t>
+            </a:r>
           </a:p>
           <a:p>
             <a:r>
               <a:rPr lang="en-001">
                 <a:hlinkClick r:id="rId8"/>
               </a:rPr>
-              <a:t>Implementation bias</a:t>
-            </a:r>
-            <a:endParaRPr lang="en-001"/>
-          </a:p>
-          <a:p>
+              <a:t>Descente de gradi</a:t>
+            </a:r>
+            <a:r>
+              <a:rPr lang="fr-FR">
+                <a:hlinkClick r:id="rId8"/>
+              </a:rPr>
+              <a:t>e</a:t>
+            </a:r>
+            <a:r>
+              <a:rPr lang="en-001">
+                <a:hlinkClick r:id="rId8"/>
+              </a:rPr>
+              <a:t>n</a:t>
+            </a:r>
+            <a:r>
+              <a:rPr lang="fr-FR">
+                <a:hlinkClick r:id="rId8"/>
+              </a:rPr>
+              <a:t>t</a:t>
+            </a:r>
+            <a:r>
+              <a:rPr lang="en-001">
+                <a:hlinkClick r:id="rId8"/>
+              </a:rPr>
+              <a:t> </a:t>
+            </a:r>
+            <a:r>
+              <a:rPr lang="fr-FR">
+                <a:hlinkClick r:id="rId8"/>
+              </a:rPr>
+              <a:t>s</a:t>
+            </a:r>
+            <a:r>
+              <a:rPr lang="en-001">
+                <a:hlinkClick r:id="rId8"/>
+              </a:rPr>
+              <a:t>t</a:t>
+            </a:r>
+            <a:r>
+              <a:rPr lang="fr-FR">
+                <a:hlinkClick r:id="rId8"/>
+              </a:rPr>
+              <a:t>o</a:t>
+            </a:r>
+            <a:r>
+              <a:rPr lang="en-001">
+                <a:hlinkClick r:id="rId8"/>
+              </a:rPr>
+              <a:t>c</a:t>
+            </a:r>
+            <a:r>
+              <a:rPr lang="fr-FR">
+                <a:hlinkClick r:id="rId8"/>
+              </a:rPr>
+              <a:t>h</a:t>
+            </a:r>
+            <a:r>
+              <a:rPr lang="en-001">
+                <a:hlinkClick r:id="rId8"/>
+              </a:rPr>
+              <a:t>a</a:t>
+            </a:r>
+            <a:r>
+              <a:rPr lang="fr-FR">
+                <a:hlinkClick r:id="rId8"/>
+              </a:rPr>
+              <a:t>s</a:t>
+            </a:r>
+            <a:r>
+              <a:rPr lang="en-001">
+                <a:hlinkClick r:id="rId8"/>
+              </a:rPr>
+              <a:t>t</a:t>
+            </a:r>
+            <a:r>
+              <a:rPr lang="fr-FR">
+                <a:hlinkClick r:id="rId8"/>
+              </a:rPr>
+              <a:t>i</a:t>
+            </a:r>
+            <a:r>
+              <a:rPr lang="en-001">
+                <a:hlinkClick r:id="rId8"/>
+              </a:rPr>
+              <a:t>q</a:t>
+            </a:r>
+            <a:r>
+              <a:rPr lang="fr-FR">
+                <a:hlinkClick r:id="rId8"/>
+              </a:rPr>
+              <a:t>u</a:t>
+            </a:r>
+            <a:r>
+              <a:rPr lang="en-001">
+                <a:hlinkClick r:id="rId8"/>
+              </a:rPr>
+              <a:t>e Adam</a:t>
+            </a:r>
+            <a:r>
+              <a:rPr lang="en-001"/>
+              <a:t> + </a:t>
+            </a:r>
             <a:r>
               <a:rPr lang="en-001">
                 <a:hlinkClick r:id="rId9"/>
               </a:rPr>
-              <a:t>Fonction exponentielle super rapide</a:t>
+              <a:t>do</a:t>
+            </a:r>
+            <a:r>
+              <a:rPr lang="fr-FR">
+                <a:hlinkClick r:id="rId9"/>
+              </a:rPr>
+              <a:t>c</a:t>
+            </a:r>
+            <a:r>
+              <a:rPr lang="en-001">
+                <a:hlinkClick r:id="rId9"/>
+              </a:rPr>
+              <a:t>u</a:t>
+            </a:r>
+            <a:r>
+              <a:rPr lang="fr-FR">
+                <a:hlinkClick r:id="rId9"/>
+              </a:rPr>
+              <a:t>m</a:t>
+            </a:r>
+            <a:r>
+              <a:rPr lang="en-001">
+                <a:hlinkClick r:id="rId9"/>
+              </a:rPr>
+              <a:t>e</a:t>
+            </a:r>
+            <a:r>
+              <a:rPr lang="fr-FR">
+                <a:hlinkClick r:id="rId9"/>
+              </a:rPr>
+              <a:t>n</a:t>
+            </a:r>
+            <a:r>
+              <a:rPr lang="en-001">
+                <a:hlinkClick r:id="rId9"/>
+              </a:rPr>
+              <a:t>t </a:t>
+            </a:r>
+            <a:r>
+              <a:rPr lang="fr-FR">
+                <a:hlinkClick r:id="rId9"/>
+              </a:rPr>
+              <a:t>o</a:t>
+            </a:r>
+            <a:r>
+              <a:rPr lang="en-001">
+                <a:hlinkClick r:id="rId9"/>
+              </a:rPr>
+              <a:t>f</a:t>
+            </a:r>
+            <a:r>
+              <a:rPr lang="fr-FR">
+                <a:hlinkClick r:id="rId9"/>
+              </a:rPr>
+              <a:t>f</a:t>
+            </a:r>
+            <a:r>
+              <a:rPr lang="en-001">
+                <a:hlinkClick r:id="rId9"/>
+              </a:rPr>
+              <a:t>i</a:t>
+            </a:r>
+            <a:r>
+              <a:rPr lang="fr-FR">
+                <a:hlinkClick r:id="rId9"/>
+              </a:rPr>
+              <a:t>c</a:t>
+            </a:r>
+            <a:r>
+              <a:rPr lang="en-001">
+                <a:hlinkClick r:id="rId9"/>
+              </a:rPr>
+              <a:t>i</a:t>
+            </a:r>
+            <a:r>
+              <a:rPr lang="fr-FR">
+                <a:hlinkClick r:id="rId9"/>
+              </a:rPr>
+              <a:t>a</a:t>
+            </a:r>
+            <a:r>
+              <a:rPr lang="en-001">
+                <a:hlinkClick r:id="rId9"/>
+              </a:rPr>
+              <a:t>l</a:t>
             </a:r>
             <a:endParaRPr lang="en-001"/>
           </a:p>
@@ -22076,6 +22112,24 @@
             <a:r>
               <a:rPr lang="en-001">
                 <a:hlinkClick r:id="rId10"/>
+              </a:rPr>
+              <a:t>Implementation bias</a:t>
+            </a:r>
+            <a:endParaRPr lang="en-001"/>
+          </a:p>
+          <a:p>
+            <a:r>
+              <a:rPr lang="en-001">
+                <a:hlinkClick r:id="rId11"/>
+              </a:rPr>
+              <a:t>Fonction exponentielle super rapide</a:t>
+            </a:r>
+            <a:endParaRPr lang="en-001"/>
+          </a:p>
+          <a:p>
+            <a:r>
+              <a:rPr lang="en-001">
+                <a:hlinkClick r:id="rId12"/>
               </a:rPr>
               <a:t>Normalize data</a:t>
             </a:r>

</xml_diff>